<commit_message>
auto commit by win-upload.bat
</commit_message>
<xml_diff>
--- a/DOC/docs/ArduinoNode.pptx
+++ b/DOC/docs/ArduinoNode.pptx
@@ -8,10 +8,11 @@
     <p:sldId id="256" r:id="rId2"/>
     <p:sldId id="257" r:id="rId3"/>
     <p:sldId id="258" r:id="rId4"/>
-    <p:sldId id="259" r:id="rId5"/>
-    <p:sldId id="260" r:id="rId6"/>
-    <p:sldId id="261" r:id="rId7"/>
-    <p:sldId id="262" r:id="rId8"/>
+    <p:sldId id="263" r:id="rId5"/>
+    <p:sldId id="259" r:id="rId6"/>
+    <p:sldId id="260" r:id="rId7"/>
+    <p:sldId id="261" r:id="rId8"/>
+    <p:sldId id="262" r:id="rId9"/>
   </p:sldIdLst>
   <p:sldSz cx="12192000" cy="6858000"/>
   <p:notesSz cx="6858000" cy="9144000"/>
@@ -265,7 +266,7 @@
           <a:p>
             <a:fld id="{1B7BBFC1-767F-4370-ABF8-558E432A7908}" type="datetimeFigureOut">
               <a:rPr lang="en-US" smtClean="0"/>
-              <a:t>6/21/2025</a:t>
+              <a:t>7/28/2025</a:t>
             </a:fld>
             <a:endParaRPr lang="en-US"/>
           </a:p>
@@ -463,7 +464,7 @@
           <a:p>
             <a:fld id="{1B7BBFC1-767F-4370-ABF8-558E432A7908}" type="datetimeFigureOut">
               <a:rPr lang="en-US" smtClean="0"/>
-              <a:t>6/21/2025</a:t>
+              <a:t>7/28/2025</a:t>
             </a:fld>
             <a:endParaRPr lang="en-US"/>
           </a:p>
@@ -671,7 +672,7 @@
           <a:p>
             <a:fld id="{1B7BBFC1-767F-4370-ABF8-558E432A7908}" type="datetimeFigureOut">
               <a:rPr lang="en-US" smtClean="0"/>
-              <a:t>6/21/2025</a:t>
+              <a:t>7/28/2025</a:t>
             </a:fld>
             <a:endParaRPr lang="en-US"/>
           </a:p>
@@ -869,7 +870,7 @@
           <a:p>
             <a:fld id="{1B7BBFC1-767F-4370-ABF8-558E432A7908}" type="datetimeFigureOut">
               <a:rPr lang="en-US" smtClean="0"/>
-              <a:t>6/21/2025</a:t>
+              <a:t>7/28/2025</a:t>
             </a:fld>
             <a:endParaRPr lang="en-US"/>
           </a:p>
@@ -1144,7 +1145,7 @@
           <a:p>
             <a:fld id="{1B7BBFC1-767F-4370-ABF8-558E432A7908}" type="datetimeFigureOut">
               <a:rPr lang="en-US" smtClean="0"/>
-              <a:t>6/21/2025</a:t>
+              <a:t>7/28/2025</a:t>
             </a:fld>
             <a:endParaRPr lang="en-US"/>
           </a:p>
@@ -1409,7 +1410,7 @@
           <a:p>
             <a:fld id="{1B7BBFC1-767F-4370-ABF8-558E432A7908}" type="datetimeFigureOut">
               <a:rPr lang="en-US" smtClean="0"/>
-              <a:t>6/21/2025</a:t>
+              <a:t>7/28/2025</a:t>
             </a:fld>
             <a:endParaRPr lang="en-US"/>
           </a:p>
@@ -1821,7 +1822,7 @@
           <a:p>
             <a:fld id="{1B7BBFC1-767F-4370-ABF8-558E432A7908}" type="datetimeFigureOut">
               <a:rPr lang="en-US" smtClean="0"/>
-              <a:t>6/21/2025</a:t>
+              <a:t>7/28/2025</a:t>
             </a:fld>
             <a:endParaRPr lang="en-US"/>
           </a:p>
@@ -1962,7 +1963,7 @@
           <a:p>
             <a:fld id="{1B7BBFC1-767F-4370-ABF8-558E432A7908}" type="datetimeFigureOut">
               <a:rPr lang="en-US" smtClean="0"/>
-              <a:t>6/21/2025</a:t>
+              <a:t>7/28/2025</a:t>
             </a:fld>
             <a:endParaRPr lang="en-US"/>
           </a:p>
@@ -2075,7 +2076,7 @@
           <a:p>
             <a:fld id="{1B7BBFC1-767F-4370-ABF8-558E432A7908}" type="datetimeFigureOut">
               <a:rPr lang="en-US" smtClean="0"/>
-              <a:t>6/21/2025</a:t>
+              <a:t>7/28/2025</a:t>
             </a:fld>
             <a:endParaRPr lang="en-US"/>
           </a:p>
@@ -2386,7 +2387,7 @@
           <a:p>
             <a:fld id="{1B7BBFC1-767F-4370-ABF8-558E432A7908}" type="datetimeFigureOut">
               <a:rPr lang="en-US" smtClean="0"/>
-              <a:t>6/21/2025</a:t>
+              <a:t>7/28/2025</a:t>
             </a:fld>
             <a:endParaRPr lang="en-US"/>
           </a:p>
@@ -2674,7 +2675,7 @@
           <a:p>
             <a:fld id="{1B7BBFC1-767F-4370-ABF8-558E432A7908}" type="datetimeFigureOut">
               <a:rPr lang="en-US" smtClean="0"/>
-              <a:t>6/21/2025</a:t>
+              <a:t>7/28/2025</a:t>
             </a:fld>
             <a:endParaRPr lang="en-US"/>
           </a:p>
@@ -2915,7 +2916,7 @@
           <a:p>
             <a:fld id="{1B7BBFC1-767F-4370-ABF8-558E432A7908}" type="datetimeFigureOut">
               <a:rPr lang="en-US" smtClean="0"/>
-              <a:t>6/21/2025</a:t>
+              <a:t>7/28/2025</a:t>
             </a:fld>
             <a:endParaRPr lang="en-US"/>
           </a:p>
@@ -4147,6 +4148,78 @@
         </p:blipFill>
         <p:spPr>
           <a:xfrm>
+            <a:off x="2160990" y="436618"/>
+            <a:ext cx="7577337" cy="5680782"/>
+          </a:xfrm>
+          <a:prstGeom prst="rect">
+            <a:avLst/>
+          </a:prstGeom>
+        </p:spPr>
+      </p:pic>
+    </p:spTree>
+    <p:extLst>
+      <p:ext uri="{BB962C8B-B14F-4D97-AF65-F5344CB8AC3E}">
+        <p14:creationId xmlns:p14="http://schemas.microsoft.com/office/powerpoint/2010/main" val="2479838890"/>
+      </p:ext>
+    </p:extLst>
+  </p:cSld>
+  <p:clrMapOvr>
+    <a:masterClrMapping/>
+  </p:clrMapOvr>
+</p:sld>
+</file>
+
+<file path=ppt/slides/slide4.xml><?xml version="1.0" encoding="utf-8"?>
+<p:sld xmlns:a="http://schemas.openxmlformats.org/drawingml/2006/main" xmlns:r="http://schemas.openxmlformats.org/officeDocument/2006/relationships" xmlns:p="http://schemas.openxmlformats.org/presentationml/2006/main">
+  <p:cSld>
+    <p:spTree>
+      <p:nvGrpSpPr>
+        <p:cNvPr id="1" name="">
+          <a:extLst>
+            <a:ext uri="{FF2B5EF4-FFF2-40B4-BE49-F238E27FC236}">
+              <a16:creationId xmlns:a16="http://schemas.microsoft.com/office/drawing/2014/main" id="{F9F268D0-170C-86F5-2F12-F5ABA0697BD1}"/>
+            </a:ext>
+          </a:extLst>
+        </p:cNvPr>
+        <p:cNvGrpSpPr/>
+        <p:nvPr/>
+      </p:nvGrpSpPr>
+      <p:grpSpPr>
+        <a:xfrm>
+          <a:off x="0" y="0"/>
+          <a:ext cx="0" cy="0"/>
+          <a:chOff x="0" y="0"/>
+          <a:chExt cx="0" cy="0"/>
+        </a:xfrm>
+      </p:grpSpPr>
+      <p:pic>
+        <p:nvPicPr>
+          <p:cNvPr id="5" name="Picture 4" descr="A red circuit board with black and blue components&#10;&#10;AI-generated content may be incorrect.">
+            <a:extLst>
+              <a:ext uri="{FF2B5EF4-FFF2-40B4-BE49-F238E27FC236}">
+                <a16:creationId xmlns:a16="http://schemas.microsoft.com/office/drawing/2014/main" id="{F499B425-F88B-497C-98A9-EC444793F9A6}"/>
+              </a:ext>
+            </a:extLst>
+          </p:cNvPr>
+          <p:cNvPicPr>
+            <a:picLocks noChangeAspect="1"/>
+          </p:cNvPicPr>
+          <p:nvPr/>
+        </p:nvPicPr>
+        <p:blipFill>
+          <a:blip r:embed="rId2">
+            <a:extLst>
+              <a:ext uri="{28A0092B-C50C-407E-A947-70E740481C1C}">
+                <a14:useLocalDpi xmlns:a14="http://schemas.microsoft.com/office/drawing/2010/main" val="0"/>
+              </a:ext>
+            </a:extLst>
+          </a:blip>
+          <a:stretch>
+            <a:fillRect/>
+          </a:stretch>
+        </p:blipFill>
+        <p:spPr>
+          <a:xfrm>
             <a:off x="2160990" y="450000"/>
             <a:ext cx="7577337" cy="5680782"/>
           </a:xfrm>
@@ -4160,7 +4233,7 @@
           <p:cNvPr id="6" name="Rectangle: Rounded Corners 5">
             <a:extLst>
               <a:ext uri="{FF2B5EF4-FFF2-40B4-BE49-F238E27FC236}">
-                <a16:creationId xmlns:a16="http://schemas.microsoft.com/office/drawing/2014/main" id="{5DADD018-A193-13F8-674F-A17BE2F735B6}"/>
+                <a16:creationId xmlns:a16="http://schemas.microsoft.com/office/drawing/2014/main" id="{BABAC7C7-1732-D381-5FBE-B28214484D0C}"/>
               </a:ext>
             </a:extLst>
           </p:cNvPr>
@@ -4213,7 +4286,7 @@
     </p:spTree>
     <p:extLst>
       <p:ext uri="{BB962C8B-B14F-4D97-AF65-F5344CB8AC3E}">
-        <p14:creationId xmlns:p14="http://schemas.microsoft.com/office/powerpoint/2010/main" val="2479838890"/>
+        <p14:creationId xmlns:p14="http://schemas.microsoft.com/office/powerpoint/2010/main" val="2298385424"/>
       </p:ext>
     </p:extLst>
   </p:cSld>
@@ -4223,7 +4296,7 @@
 </p:sld>
 </file>
 
-<file path=ppt/slides/slide4.xml><?xml version="1.0" encoding="utf-8"?>
+<file path=ppt/slides/slide5.xml><?xml version="1.0" encoding="utf-8"?>
 <p:sld xmlns:a="http://schemas.openxmlformats.org/drawingml/2006/main" xmlns:r="http://schemas.openxmlformats.org/officeDocument/2006/relationships" xmlns:p="http://schemas.openxmlformats.org/presentationml/2006/main">
   <p:cSld>
     <p:spTree>
@@ -4350,7 +4423,7 @@
 </p:sld>
 </file>
 
-<file path=ppt/slides/slide5.xml><?xml version="1.0" encoding="utf-8"?>
+<file path=ppt/slides/slide6.xml><?xml version="1.0" encoding="utf-8"?>
 <p:sld xmlns:a="http://schemas.openxmlformats.org/drawingml/2006/main" xmlns:r="http://schemas.openxmlformats.org/officeDocument/2006/relationships" xmlns:p="http://schemas.openxmlformats.org/presentationml/2006/main">
   <p:cSld>
     <p:spTree>
@@ -4477,7 +4550,7 @@
 </p:sld>
 </file>
 
-<file path=ppt/slides/slide6.xml><?xml version="1.0" encoding="utf-8"?>
+<file path=ppt/slides/slide7.xml><?xml version="1.0" encoding="utf-8"?>
 <p:sld xmlns:a="http://schemas.openxmlformats.org/drawingml/2006/main" xmlns:r="http://schemas.openxmlformats.org/officeDocument/2006/relationships" xmlns:p="http://schemas.openxmlformats.org/presentationml/2006/main">
   <p:cSld>
     <p:spTree>
@@ -4604,7 +4677,7 @@
 </p:sld>
 </file>
 
-<file path=ppt/slides/slide7.xml><?xml version="1.0" encoding="utf-8"?>
+<file path=ppt/slides/slide8.xml><?xml version="1.0" encoding="utf-8"?>
 <p:sld xmlns:a="http://schemas.openxmlformats.org/drawingml/2006/main" xmlns:r="http://schemas.openxmlformats.org/officeDocument/2006/relationships" xmlns:p="http://schemas.openxmlformats.org/presentationml/2006/main">
   <p:cSld>
     <p:spTree>

</xml_diff>